<commit_message>
Step 7. Containerization 8. Kubernetes
Done
</commit_message>
<xml_diff>
--- a/Step08-Kubernetes_presentation.pptx
+++ b/Step08-Kubernetes_presentation.pptx
@@ -6,7 +6,7 @@
     <p:sldMasterId id="2147483648" r:id="rId2"/>
   </p:sldMasterIdLst>
   <p:notesMasterIdLst>
-    <p:notesMasterId r:id="rId21"/>
+    <p:notesMasterId r:id="rId25"/>
   </p:notesMasterIdLst>
   <p:sldIdLst>
     <p:sldId id="302" r:id="rId3"/>
@@ -27,6 +27,10 @@
     <p:sldId id="316" r:id="rId18"/>
     <p:sldId id="317" r:id="rId19"/>
     <p:sldId id="318" r:id="rId20"/>
+    <p:sldId id="319" r:id="rId21"/>
+    <p:sldId id="320" r:id="rId22"/>
+    <p:sldId id="321" r:id="rId23"/>
+    <p:sldId id="322" r:id="rId24"/>
   </p:sldIdLst>
   <p:sldSz cx="12192000" cy="6858000"/>
   <p:notesSz cx="6858000" cy="9144000"/>
@@ -152,6 +156,10 @@
             <p14:sldId id="316"/>
             <p14:sldId id="317"/>
             <p14:sldId id="318"/>
+            <p14:sldId id="319"/>
+            <p14:sldId id="320"/>
+            <p14:sldId id="321"/>
+            <p14:sldId id="322"/>
           </p14:sldIdLst>
         </p14:section>
       </p14:sectionLst>
@@ -166,7 +174,7 @@
 <file path=ppt/revisionInfo.xml><?xml version="1.0" encoding="utf-8"?>
 <p1510:revInfo xmlns:a="http://schemas.openxmlformats.org/drawingml/2006/main" xmlns:r="http://schemas.openxmlformats.org/officeDocument/2006/relationships" xmlns:p1510="http://schemas.microsoft.com/office/powerpoint/2015/10/main">
   <p1510:revLst>
-    <p1510:client id="{87F444D9-AB70-4B82-9739-5BD0D13BB243}" v="13" dt="2024-02-07T16:44:29.205"/>
+    <p1510:client id="{87F444D9-AB70-4B82-9739-5BD0D13BB243}" v="36" dt="2024-02-08T09:14:51.346"/>
   </p1510:revLst>
 </p1510:revInfo>
 </file>
@@ -4433,7 +4441,7 @@
   <pc:docChgLst>
     <pc:chgData name="Ihor Aleksandrov" userId="c3051032-6b87-4db2-b257-777a0106fbd9" providerId="ADAL" clId="{87F444D9-AB70-4B82-9739-5BD0D13BB243}"/>
     <pc:docChg chg="undo custSel addSld delSld modSld sldOrd delSection modSection">
-      <pc:chgData name="Ihor Aleksandrov" userId="c3051032-6b87-4db2-b257-777a0106fbd9" providerId="ADAL" clId="{87F444D9-AB70-4B82-9739-5BD0D13BB243}" dt="2024-02-07T16:44:35.512" v="185" actId="1076"/>
+      <pc:chgData name="Ihor Aleksandrov" userId="c3051032-6b87-4db2-b257-777a0106fbd9" providerId="ADAL" clId="{87F444D9-AB70-4B82-9739-5BD0D13BB243}" dt="2024-02-08T09:14:45.665" v="258" actId="14100"/>
       <pc:docMkLst>
         <pc:docMk/>
       </pc:docMkLst>
@@ -4467,6 +4475,21 @@
           </ac:spMkLst>
         </pc:spChg>
       </pc:sldChg>
+      <pc:sldChg chg="modSp mod">
+        <pc:chgData name="Ihor Aleksandrov" userId="c3051032-6b87-4db2-b257-777a0106fbd9" providerId="ADAL" clId="{87F444D9-AB70-4B82-9739-5BD0D13BB243}" dt="2024-02-08T09:14:45.665" v="258" actId="14100"/>
+        <pc:sldMkLst>
+          <pc:docMk/>
+          <pc:sldMk cId="2972731808" sldId="303"/>
+        </pc:sldMkLst>
+        <pc:graphicFrameChg chg="mod">
+          <ac:chgData name="Ihor Aleksandrov" userId="c3051032-6b87-4db2-b257-777a0106fbd9" providerId="ADAL" clId="{87F444D9-AB70-4B82-9739-5BD0D13BB243}" dt="2024-02-08T09:14:45.665" v="258" actId="14100"/>
+          <ac:graphicFrameMkLst>
+            <pc:docMk/>
+            <pc:sldMk cId="2972731808" sldId="303"/>
+            <ac:graphicFrameMk id="50" creationId="{438840ED-2B50-ED19-12CF-99B1789AE150}"/>
+          </ac:graphicFrameMkLst>
+        </pc:graphicFrameChg>
+      </pc:sldChg>
       <pc:sldChg chg="addSp delSp modSp mod">
         <pc:chgData name="Ihor Aleksandrov" userId="c3051032-6b87-4db2-b257-777a0106fbd9" providerId="ADAL" clId="{87F444D9-AB70-4B82-9739-5BD0D13BB243}" dt="2024-02-07T15:13:48.903" v="20" actId="1076"/>
         <pc:sldMkLst>
@@ -5093,6 +5116,37 @@
           <pc:sldMk cId="3002130769" sldId="318"/>
         </pc:sldMkLst>
       </pc:sldChg>
+      <pc:sldChg chg="addSp delSp modSp add mod">
+        <pc:chgData name="Ihor Aleksandrov" userId="c3051032-6b87-4db2-b257-777a0106fbd9" providerId="ADAL" clId="{87F444D9-AB70-4B82-9739-5BD0D13BB243}" dt="2024-02-08T08:59:29.063" v="200" actId="1076"/>
+        <pc:sldMkLst>
+          <pc:docMk/>
+          <pc:sldMk cId="2438032746" sldId="319"/>
+        </pc:sldMkLst>
+        <pc:spChg chg="mod">
+          <ac:chgData name="Ihor Aleksandrov" userId="c3051032-6b87-4db2-b257-777a0106fbd9" providerId="ADAL" clId="{87F444D9-AB70-4B82-9739-5BD0D13BB243}" dt="2024-02-08T08:58:50.167" v="196" actId="20577"/>
+          <ac:spMkLst>
+            <pc:docMk/>
+            <pc:sldMk cId="2438032746" sldId="319"/>
+            <ac:spMk id="2" creationId="{53C5D828-9666-E312-B574-9FE965A7D6BE}"/>
+          </ac:spMkLst>
+        </pc:spChg>
+        <pc:picChg chg="del">
+          <ac:chgData name="Ihor Aleksandrov" userId="c3051032-6b87-4db2-b257-777a0106fbd9" providerId="ADAL" clId="{87F444D9-AB70-4B82-9739-5BD0D13BB243}" dt="2024-02-08T08:59:06.857" v="197" actId="478"/>
+          <ac:picMkLst>
+            <pc:docMk/>
+            <pc:sldMk cId="2438032746" sldId="319"/>
+            <ac:picMk id="4" creationId="{7F2A9F45-AF0E-41EB-CBB4-D7A1284F6DFF}"/>
+          </ac:picMkLst>
+        </pc:picChg>
+        <pc:picChg chg="add mod">
+          <ac:chgData name="Ihor Aleksandrov" userId="c3051032-6b87-4db2-b257-777a0106fbd9" providerId="ADAL" clId="{87F444D9-AB70-4B82-9739-5BD0D13BB243}" dt="2024-02-08T08:59:29.063" v="200" actId="1076"/>
+          <ac:picMkLst>
+            <pc:docMk/>
+            <pc:sldMk cId="2438032746" sldId="319"/>
+            <ac:picMk id="5" creationId="{5F1C87C8-7726-14B1-9228-199C17B05F5E}"/>
+          </ac:picMkLst>
+        </pc:picChg>
+      </pc:sldChg>
       <pc:sldChg chg="del">
         <pc:chgData name="Ihor Aleksandrov" userId="c3051032-6b87-4db2-b257-777a0106fbd9" providerId="ADAL" clId="{87F444D9-AB70-4B82-9739-5BD0D13BB243}" dt="2024-02-07T14:34:04.700" v="3" actId="47"/>
         <pc:sldMkLst>
@@ -5107,6 +5161,61 @@
           <pc:sldMk cId="2008541574" sldId="320"/>
         </pc:sldMkLst>
       </pc:sldChg>
+      <pc:sldChg chg="addSp delSp modSp add mod">
+        <pc:chgData name="Ihor Aleksandrov" userId="c3051032-6b87-4db2-b257-777a0106fbd9" providerId="ADAL" clId="{87F444D9-AB70-4B82-9739-5BD0D13BB243}" dt="2024-02-08T09:04:49.639" v="223"/>
+        <pc:sldMkLst>
+          <pc:docMk/>
+          <pc:sldMk cId="2779841426" sldId="320"/>
+        </pc:sldMkLst>
+        <pc:spChg chg="mod">
+          <ac:chgData name="Ihor Aleksandrov" userId="c3051032-6b87-4db2-b257-777a0106fbd9" providerId="ADAL" clId="{87F444D9-AB70-4B82-9739-5BD0D13BB243}" dt="2024-02-08T09:04:49.639" v="223"/>
+          <ac:spMkLst>
+            <pc:docMk/>
+            <pc:sldMk cId="2779841426" sldId="320"/>
+            <ac:spMk id="2" creationId="{53C5D828-9666-E312-B574-9FE965A7D6BE}"/>
+          </ac:spMkLst>
+        </pc:spChg>
+        <pc:picChg chg="add del">
+          <ac:chgData name="Ihor Aleksandrov" userId="c3051032-6b87-4db2-b257-777a0106fbd9" providerId="ADAL" clId="{87F444D9-AB70-4B82-9739-5BD0D13BB243}" dt="2024-02-08T09:02:04.336" v="204"/>
+          <ac:picMkLst>
+            <pc:docMk/>
+            <pc:sldMk cId="2779841426" sldId="320"/>
+            <ac:picMk id="4" creationId="{B1C10FF9-6CB4-78A6-11E0-737771E74408}"/>
+          </ac:picMkLst>
+        </pc:picChg>
+        <pc:picChg chg="del">
+          <ac:chgData name="Ihor Aleksandrov" userId="c3051032-6b87-4db2-b257-777a0106fbd9" providerId="ADAL" clId="{87F444D9-AB70-4B82-9739-5BD0D13BB243}" dt="2024-02-08T09:01:56.625" v="202" actId="478"/>
+          <ac:picMkLst>
+            <pc:docMk/>
+            <pc:sldMk cId="2779841426" sldId="320"/>
+            <ac:picMk id="5" creationId="{5F1C87C8-7726-14B1-9228-199C17B05F5E}"/>
+          </ac:picMkLst>
+        </pc:picChg>
+        <pc:picChg chg="add del mod">
+          <ac:chgData name="Ihor Aleksandrov" userId="c3051032-6b87-4db2-b257-777a0106fbd9" providerId="ADAL" clId="{87F444D9-AB70-4B82-9739-5BD0D13BB243}" dt="2024-02-08T09:03:36.134" v="213" actId="478"/>
+          <ac:picMkLst>
+            <pc:docMk/>
+            <pc:sldMk cId="2779841426" sldId="320"/>
+            <ac:picMk id="7" creationId="{58085562-3561-D941-7D2D-1996289E0FA6}"/>
+          </ac:picMkLst>
+        </pc:picChg>
+        <pc:picChg chg="add del">
+          <ac:chgData name="Ihor Aleksandrov" userId="c3051032-6b87-4db2-b257-777a0106fbd9" providerId="ADAL" clId="{87F444D9-AB70-4B82-9739-5BD0D13BB243}" dt="2024-02-08T09:03:41.672" v="215"/>
+          <ac:picMkLst>
+            <pc:docMk/>
+            <pc:sldMk cId="2779841426" sldId="320"/>
+            <ac:picMk id="8" creationId="{E32F08DC-AA83-A985-8A23-903BBED8008C}"/>
+          </ac:picMkLst>
+        </pc:picChg>
+        <pc:picChg chg="add mod">
+          <ac:chgData name="Ihor Aleksandrov" userId="c3051032-6b87-4db2-b257-777a0106fbd9" providerId="ADAL" clId="{87F444D9-AB70-4B82-9739-5BD0D13BB243}" dt="2024-02-08T09:04:33.548" v="220" actId="1076"/>
+          <ac:picMkLst>
+            <pc:docMk/>
+            <pc:sldMk cId="2779841426" sldId="320"/>
+            <ac:picMk id="10" creationId="{AFD23CF5-0199-8B30-1BE1-D9E6989A351D}"/>
+          </ac:picMkLst>
+        </pc:picChg>
+      </pc:sldChg>
       <pc:sldChg chg="del">
         <pc:chgData name="Ihor Aleksandrov" userId="c3051032-6b87-4db2-b257-777a0106fbd9" providerId="ADAL" clId="{87F444D9-AB70-4B82-9739-5BD0D13BB243}" dt="2024-02-07T14:34:04.700" v="3" actId="47"/>
         <pc:sldMkLst>
@@ -5114,12 +5223,82 @@
           <pc:sldMk cId="2079661106" sldId="321"/>
         </pc:sldMkLst>
       </pc:sldChg>
+      <pc:sldChg chg="addSp delSp modSp add mod">
+        <pc:chgData name="Ihor Aleksandrov" userId="c3051032-6b87-4db2-b257-777a0106fbd9" providerId="ADAL" clId="{87F444D9-AB70-4B82-9739-5BD0D13BB243}" dt="2024-02-08T09:11:04.723" v="233" actId="1076"/>
+        <pc:sldMkLst>
+          <pc:docMk/>
+          <pc:sldMk cId="4159126741" sldId="321"/>
+        </pc:sldMkLst>
+        <pc:spChg chg="mod">
+          <ac:chgData name="Ihor Aleksandrov" userId="c3051032-6b87-4db2-b257-777a0106fbd9" providerId="ADAL" clId="{87F444D9-AB70-4B82-9739-5BD0D13BB243}" dt="2024-02-08T09:10:16.386" v="227"/>
+          <ac:spMkLst>
+            <pc:docMk/>
+            <pc:sldMk cId="4159126741" sldId="321"/>
+            <ac:spMk id="2" creationId="{53C5D828-9666-E312-B574-9FE965A7D6BE}"/>
+          </ac:spMkLst>
+        </pc:spChg>
+        <pc:picChg chg="add mod">
+          <ac:chgData name="Ihor Aleksandrov" userId="c3051032-6b87-4db2-b257-777a0106fbd9" providerId="ADAL" clId="{87F444D9-AB70-4B82-9739-5BD0D13BB243}" dt="2024-02-08T09:11:04.723" v="233" actId="1076"/>
+          <ac:picMkLst>
+            <pc:docMk/>
+            <pc:sldMk cId="4159126741" sldId="321"/>
+            <ac:picMk id="5" creationId="{973C29E6-2B0E-84B0-7B5B-A426B0585B3F}"/>
+          </ac:picMkLst>
+        </pc:picChg>
+        <pc:picChg chg="del">
+          <ac:chgData name="Ihor Aleksandrov" userId="c3051032-6b87-4db2-b257-777a0106fbd9" providerId="ADAL" clId="{87F444D9-AB70-4B82-9739-5BD0D13BB243}" dt="2024-02-08T09:10:17.855" v="228" actId="478"/>
+          <ac:picMkLst>
+            <pc:docMk/>
+            <pc:sldMk cId="4159126741" sldId="321"/>
+            <ac:picMk id="10" creationId="{AFD23CF5-0199-8B30-1BE1-D9E6989A351D}"/>
+          </ac:picMkLst>
+        </pc:picChg>
+      </pc:sldChg>
       <pc:sldChg chg="del">
         <pc:chgData name="Ihor Aleksandrov" userId="c3051032-6b87-4db2-b257-777a0106fbd9" providerId="ADAL" clId="{87F444D9-AB70-4B82-9739-5BD0D13BB243}" dt="2024-02-07T14:34:04.700" v="3" actId="47"/>
         <pc:sldMkLst>
           <pc:docMk/>
           <pc:sldMk cId="129948205" sldId="322"/>
         </pc:sldMkLst>
+      </pc:sldChg>
+      <pc:sldChg chg="addSp delSp modSp add mod">
+        <pc:chgData name="Ihor Aleksandrov" userId="c3051032-6b87-4db2-b257-777a0106fbd9" providerId="ADAL" clId="{87F444D9-AB70-4B82-9739-5BD0D13BB243}" dt="2024-02-08T09:13:08.954" v="244" actId="20577"/>
+        <pc:sldMkLst>
+          <pc:docMk/>
+          <pc:sldMk cId="3987160844" sldId="322"/>
+        </pc:sldMkLst>
+        <pc:spChg chg="mod">
+          <ac:chgData name="Ihor Aleksandrov" userId="c3051032-6b87-4db2-b257-777a0106fbd9" providerId="ADAL" clId="{87F444D9-AB70-4B82-9739-5BD0D13BB243}" dt="2024-02-08T09:13:08.954" v="244" actId="20577"/>
+          <ac:spMkLst>
+            <pc:docMk/>
+            <pc:sldMk cId="3987160844" sldId="322"/>
+            <ac:spMk id="2" creationId="{53C5D828-9666-E312-B574-9FE965A7D6BE}"/>
+          </ac:spMkLst>
+        </pc:spChg>
+        <pc:picChg chg="add del">
+          <ac:chgData name="Ihor Aleksandrov" userId="c3051032-6b87-4db2-b257-777a0106fbd9" providerId="ADAL" clId="{87F444D9-AB70-4B82-9739-5BD0D13BB243}" dt="2024-02-08T09:12:51.023" v="237"/>
+          <ac:picMkLst>
+            <pc:docMk/>
+            <pc:sldMk cId="3987160844" sldId="322"/>
+            <ac:picMk id="4" creationId="{695E1AAF-AB53-52D1-BCD9-BCCE914BA8E8}"/>
+          </ac:picMkLst>
+        </pc:picChg>
+        <pc:picChg chg="del">
+          <ac:chgData name="Ihor Aleksandrov" userId="c3051032-6b87-4db2-b257-777a0106fbd9" providerId="ADAL" clId="{87F444D9-AB70-4B82-9739-5BD0D13BB243}" dt="2024-02-08T09:12:47.405" v="235" actId="478"/>
+          <ac:picMkLst>
+            <pc:docMk/>
+            <pc:sldMk cId="3987160844" sldId="322"/>
+            <ac:picMk id="5" creationId="{973C29E6-2B0E-84B0-7B5B-A426B0585B3F}"/>
+          </ac:picMkLst>
+        </pc:picChg>
+        <pc:picChg chg="add mod">
+          <ac:chgData name="Ihor Aleksandrov" userId="c3051032-6b87-4db2-b257-777a0106fbd9" providerId="ADAL" clId="{87F444D9-AB70-4B82-9739-5BD0D13BB243}" dt="2024-02-08T09:13:05.012" v="240" actId="1076"/>
+          <ac:picMkLst>
+            <pc:docMk/>
+            <pc:sldMk cId="3987160844" sldId="322"/>
+            <ac:picMk id="6" creationId="{A3571683-0A9A-4135-6285-8210F80901C7}"/>
+          </ac:picMkLst>
+        </pc:picChg>
       </pc:sldChg>
     </pc:docChg>
   </pc:docChgLst>
@@ -8166,9 +8345,10 @@
         <a:lstStyle/>
         <a:p>
           <a:r>
-            <a:rPr lang="en-US" dirty="0"/>
-            <a:t>Containers</a:t>
+            <a:rPr lang="en-US"/>
+            <a:t>Kubernetes</a:t>
           </a:r>
+          <a:endParaRPr lang="en-US" dirty="0"/>
         </a:p>
       </dgm:t>
       <dgm:extLst>
@@ -8201,49 +8381,6 @@
         </a:p>
       </dgm:t>
     </dgm:pt>
-    <dgm:pt modelId="{2240D41D-9269-4094-AEBC-1664425632DB}">
-      <dgm:prSet/>
-      <dgm:spPr/>
-      <dgm:t>
-        <a:bodyPr/>
-        <a:lstStyle/>
-        <a:p>
-          <a:r>
-            <a:rPr lang="en-US" dirty="0"/>
-            <a:t>Docker</a:t>
-          </a:r>
-        </a:p>
-      </dgm:t>
-      <dgm:extLst>
-        <a:ext uri="{E40237B7-FDA0-4F09-8148-C483321AD2D9}">
-          <dgm14:cNvPr xmlns:dgm14="http://schemas.microsoft.com/office/drawing/2010/diagram" id="0" name="">
-            <a:hlinkClick xmlns:r="http://schemas.openxmlformats.org/officeDocument/2006/relationships" r:id="rId2" action="ppaction://hlinksldjump"/>
-          </dgm14:cNvPr>
-        </a:ext>
-      </dgm:extLst>
-    </dgm:pt>
-    <dgm:pt modelId="{23766FE5-DD90-4BD8-82A9-33CBDF55210E}" type="parTrans" cxnId="{99A6CC83-AE40-4A47-9C08-1C60E1C3B682}">
-      <dgm:prSet/>
-      <dgm:spPr/>
-      <dgm:t>
-        <a:bodyPr/>
-        <a:lstStyle/>
-        <a:p>
-          <a:endParaRPr lang="ru-UA"/>
-        </a:p>
-      </dgm:t>
-    </dgm:pt>
-    <dgm:pt modelId="{474E530C-8388-441E-8514-9E5C43069E6C}" type="sibTrans" cxnId="{99A6CC83-AE40-4A47-9C08-1C60E1C3B682}">
-      <dgm:prSet/>
-      <dgm:spPr/>
-      <dgm:t>
-        <a:bodyPr/>
-        <a:lstStyle/>
-        <a:p>
-          <a:endParaRPr lang="ru-UA"/>
-        </a:p>
-      </dgm:t>
-    </dgm:pt>
     <dgm:pt modelId="{76D6B6BC-F8F0-4466-930A-673E438AD175}" type="pres">
       <dgm:prSet presAssocID="{1C600E66-A0CB-470F-8514-C91590285CB3}" presName="Name0" presStyleCnt="0">
         <dgm:presLayoutVars>
@@ -8259,24 +8396,7 @@
       <dgm:spPr/>
     </dgm:pt>
     <dgm:pt modelId="{FF5931E5-6577-45BF-AE5E-698950A6CB7C}" type="pres">
-      <dgm:prSet presAssocID="{64E9ACE6-9AFD-4BBA-80CB-01DA1300E087}" presName="parentText" presStyleLbl="node1" presStyleIdx="0" presStyleCnt="2">
-        <dgm:presLayoutVars>
-          <dgm:chMax val="1"/>
-          <dgm:bulletEnabled val="1"/>
-        </dgm:presLayoutVars>
-      </dgm:prSet>
-      <dgm:spPr/>
-    </dgm:pt>
-    <dgm:pt modelId="{4ECE9EB2-DDA7-42FC-BF9E-18B0138FE3B5}" type="pres">
-      <dgm:prSet presAssocID="{7B2C8051-D046-465E-BB80-77D9BB7B38CD}" presName="sp" presStyleCnt="0"/>
-      <dgm:spPr/>
-    </dgm:pt>
-    <dgm:pt modelId="{365DAA1E-0EA2-4779-BA2C-86211B24E914}" type="pres">
-      <dgm:prSet presAssocID="{2240D41D-9269-4094-AEBC-1664425632DB}" presName="linNode" presStyleCnt="0"/>
-      <dgm:spPr/>
-    </dgm:pt>
-    <dgm:pt modelId="{B6CE390F-56AC-45A8-A0DF-3A7B8C2FEB1E}" type="pres">
-      <dgm:prSet presAssocID="{2240D41D-9269-4094-AEBC-1664425632DB}" presName="parentText" presStyleLbl="node1" presStyleIdx="1" presStyleCnt="2">
+      <dgm:prSet presAssocID="{64E9ACE6-9AFD-4BBA-80CB-01DA1300E087}" presName="parentText" presStyleLbl="node1" presStyleIdx="0" presStyleCnt="1">
         <dgm:presLayoutVars>
           <dgm:chMax val="1"/>
           <dgm:bulletEnabled val="1"/>
@@ -8287,15 +8407,10 @@
   </dgm:ptLst>
   <dgm:cxnLst>
     <dgm:cxn modelId="{5164DF79-C7E6-4470-A977-53A07031A3C0}" type="presOf" srcId="{1C600E66-A0CB-470F-8514-C91590285CB3}" destId="{76D6B6BC-F8F0-4466-930A-673E438AD175}" srcOrd="0" destOrd="0" presId="urn:microsoft.com/office/officeart/2005/8/layout/vList5"/>
-    <dgm:cxn modelId="{99A6CC83-AE40-4A47-9C08-1C60E1C3B682}" srcId="{1C600E66-A0CB-470F-8514-C91590285CB3}" destId="{2240D41D-9269-4094-AEBC-1664425632DB}" srcOrd="1" destOrd="0" parTransId="{23766FE5-DD90-4BD8-82A9-33CBDF55210E}" sibTransId="{474E530C-8388-441E-8514-9E5C43069E6C}"/>
-    <dgm:cxn modelId="{30C6AD8A-2368-4D50-9E5F-AACEB3623078}" type="presOf" srcId="{2240D41D-9269-4094-AEBC-1664425632DB}" destId="{B6CE390F-56AC-45A8-A0DF-3A7B8C2FEB1E}" srcOrd="0" destOrd="0" presId="urn:microsoft.com/office/officeart/2005/8/layout/vList5"/>
     <dgm:cxn modelId="{C7C38DA0-CE59-4FEF-BFD1-6FDA69259313}" srcId="{1C600E66-A0CB-470F-8514-C91590285CB3}" destId="{64E9ACE6-9AFD-4BBA-80CB-01DA1300E087}" srcOrd="0" destOrd="0" parTransId="{FD0FAFBC-EEAF-4FBF-916F-D182FE250A26}" sibTransId="{7B2C8051-D046-465E-BB80-77D9BB7B38CD}"/>
     <dgm:cxn modelId="{F2AC53BB-E0F7-4A6D-8F21-5A745B7FF3EF}" type="presOf" srcId="{64E9ACE6-9AFD-4BBA-80CB-01DA1300E087}" destId="{FF5931E5-6577-45BF-AE5E-698950A6CB7C}" srcOrd="0" destOrd="0" presId="urn:microsoft.com/office/officeart/2005/8/layout/vList5"/>
     <dgm:cxn modelId="{17EF8E67-277A-49D4-AC45-E6BAE828A53D}" type="presParOf" srcId="{76D6B6BC-F8F0-4466-930A-673E438AD175}" destId="{28572EFC-4B6F-43FA-9BAF-1372789AF0BC}" srcOrd="0" destOrd="0" presId="urn:microsoft.com/office/officeart/2005/8/layout/vList5"/>
     <dgm:cxn modelId="{BEE7790A-1A86-4AC5-926A-8684AC7E160D}" type="presParOf" srcId="{28572EFC-4B6F-43FA-9BAF-1372789AF0BC}" destId="{FF5931E5-6577-45BF-AE5E-698950A6CB7C}" srcOrd="0" destOrd="0" presId="urn:microsoft.com/office/officeart/2005/8/layout/vList5"/>
-    <dgm:cxn modelId="{A1CEFADC-E666-418E-A8EF-60AF891E80F1}" type="presParOf" srcId="{76D6B6BC-F8F0-4466-930A-673E438AD175}" destId="{4ECE9EB2-DDA7-42FC-BF9E-18B0138FE3B5}" srcOrd="1" destOrd="0" presId="urn:microsoft.com/office/officeart/2005/8/layout/vList5"/>
-    <dgm:cxn modelId="{EA31EEF1-153D-49E7-9DDC-711023DD751D}" type="presParOf" srcId="{76D6B6BC-F8F0-4466-930A-673E438AD175}" destId="{365DAA1E-0EA2-4779-BA2C-86211B24E914}" srcOrd="2" destOrd="0" presId="urn:microsoft.com/office/officeart/2005/8/layout/vList5"/>
-    <dgm:cxn modelId="{6BFF6DAC-E656-484E-8838-F79ECABD3DD1}" type="presParOf" srcId="{365DAA1E-0EA2-4779-BA2C-86211B24E914}" destId="{B6CE390F-56AC-45A8-A0DF-3A7B8C2FEB1E}" srcOrd="0" destOrd="0" presId="urn:microsoft.com/office/officeart/2005/8/layout/vList5"/>
   </dgm:cxnLst>
   <dgm:bg/>
   <dgm:whole/>
@@ -8322,8 +8437,8 @@
       </dsp:nvSpPr>
       <dsp:spPr>
         <a:xfrm>
-          <a:off x="2044999" y="42"/>
-          <a:ext cx="2300624" cy="1709811"/>
+          <a:off x="2044999" y="0"/>
+          <a:ext cx="2300624" cy="1629294"/>
         </a:xfrm>
         <a:prstGeom prst="roundRect">
           <a:avLst/>
@@ -8365,12 +8480,12 @@
         </a:fontRef>
       </dsp:style>
       <dsp:txBody>
-        <a:bodyPr spcFirstLastPara="0" vert="horz" wrap="square" lIns="125730" tIns="62865" rIns="125730" bIns="62865" numCol="1" spcCol="1270" anchor="ctr" anchorCtr="0">
+        <a:bodyPr spcFirstLastPara="0" vert="horz" wrap="square" lIns="121920" tIns="60960" rIns="121920" bIns="60960" numCol="1" spcCol="1270" anchor="ctr" anchorCtr="0">
           <a:noAutofit/>
         </a:bodyPr>
         <a:lstStyle/>
         <a:p>
-          <a:pPr marL="0" lvl="0" indent="0" algn="ctr" defTabSz="1466850">
+          <a:pPr marL="0" lvl="0" indent="0" algn="ctr" defTabSz="1422400">
             <a:lnSpc>
               <a:spcPct val="90000"/>
             </a:lnSpc>
@@ -8383,92 +8498,15 @@
             <a:buNone/>
           </a:pPr>
           <a:r>
-            <a:rPr lang="en-US" sz="3300" kern="1200" dirty="0"/>
-            <a:t>Containers</a:t>
+            <a:rPr lang="en-US" sz="3200" kern="1200"/>
+            <a:t>Kubernetes</a:t>
           </a:r>
+          <a:endParaRPr lang="en-US" sz="3200" kern="1200" dirty="0"/>
         </a:p>
       </dsp:txBody>
       <dsp:txXfrm>
-        <a:off x="2128465" y="83508"/>
-        <a:ext cx="2133692" cy="1542879"/>
-      </dsp:txXfrm>
-    </dsp:sp>
-    <dsp:sp modelId="{B6CE390F-56AC-45A8-A0DF-3A7B8C2FEB1E}">
-      <dsp:nvSpPr>
-        <dsp:cNvPr id="0" name=""/>
-        <dsp:cNvSpPr/>
-      </dsp:nvSpPr>
-      <dsp:spPr>
-        <a:xfrm>
-          <a:off x="2044999" y="1795345"/>
-          <a:ext cx="2300624" cy="1709811"/>
-        </a:xfrm>
-        <a:prstGeom prst="roundRect">
-          <a:avLst/>
-        </a:prstGeom>
-        <a:solidFill>
-          <a:schemeClr val="accent1">
-            <a:hueOff val="0"/>
-            <a:satOff val="0"/>
-            <a:lumOff val="0"/>
-            <a:alphaOff val="0"/>
-          </a:schemeClr>
-        </a:solidFill>
-        <a:ln w="12700" cap="flat" cmpd="sng" algn="ctr">
-          <a:solidFill>
-            <a:schemeClr val="lt1">
-              <a:hueOff val="0"/>
-              <a:satOff val="0"/>
-              <a:lumOff val="0"/>
-              <a:alphaOff val="0"/>
-            </a:schemeClr>
-          </a:solidFill>
-          <a:prstDash val="solid"/>
-          <a:miter lim="800000"/>
-        </a:ln>
-        <a:effectLst/>
-      </dsp:spPr>
-      <dsp:style>
-        <a:lnRef idx="2">
-          <a:scrgbClr r="0" g="0" b="0"/>
-        </a:lnRef>
-        <a:fillRef idx="1">
-          <a:scrgbClr r="0" g="0" b="0"/>
-        </a:fillRef>
-        <a:effectRef idx="0">
-          <a:scrgbClr r="0" g="0" b="0"/>
-        </a:effectRef>
-        <a:fontRef idx="minor">
-          <a:schemeClr val="lt1"/>
-        </a:fontRef>
-      </dsp:style>
-      <dsp:txBody>
-        <a:bodyPr spcFirstLastPara="0" vert="horz" wrap="square" lIns="125730" tIns="62865" rIns="125730" bIns="62865" numCol="1" spcCol="1270" anchor="ctr" anchorCtr="0">
-          <a:noAutofit/>
-        </a:bodyPr>
-        <a:lstStyle/>
-        <a:p>
-          <a:pPr marL="0" lvl="0" indent="0" algn="ctr" defTabSz="1466850">
-            <a:lnSpc>
-              <a:spcPct val="90000"/>
-            </a:lnSpc>
-            <a:spcBef>
-              <a:spcPct val="0"/>
-            </a:spcBef>
-            <a:spcAft>
-              <a:spcPct val="35000"/>
-            </a:spcAft>
-            <a:buNone/>
-          </a:pPr>
-          <a:r>
-            <a:rPr lang="en-US" sz="3300" kern="1200" dirty="0"/>
-            <a:t>Docker</a:t>
-          </a:r>
-        </a:p>
-      </dsp:txBody>
-      <dsp:txXfrm>
-        <a:off x="2128465" y="1878811"/>
-        <a:ext cx="2133692" cy="1542879"/>
+        <a:off x="2124535" y="79536"/>
+        <a:ext cx="2141552" cy="1470222"/>
       </dsp:txXfrm>
     </dsp:sp>
   </dsp:spTree>
@@ -9824,7 +9862,7 @@
           <a:p>
             <a:fld id="{14FB1113-EC1E-4052-ADC3-711A8186C8F9}" type="datetimeFigureOut">
               <a:rPr lang="ru-UA" smtClean="0"/>
-              <a:t>07.02.2024</a:t>
+              <a:t>08.02.2024</a:t>
             </a:fld>
             <a:endParaRPr lang="ru-UA"/>
           </a:p>
@@ -10241,7 +10279,7 @@
           <a:p>
             <a:fld id="{7476BE5F-858D-4495-BCBE-21684EDC0B5C}" type="datetime1">
               <a:rPr lang="ru-UA" smtClean="0"/>
-              <a:t>07.02.2024</a:t>
+              <a:t>08.02.2024</a:t>
             </a:fld>
             <a:endParaRPr lang="ru-UA"/>
           </a:p>
@@ -10445,7 +10483,7 @@
           <a:p>
             <a:fld id="{D84C6B54-3FFD-4655-88D6-F687931AC196}" type="datetime1">
               <a:rPr lang="ru-UA" smtClean="0"/>
-              <a:t>07.02.2024</a:t>
+              <a:t>08.02.2024</a:t>
             </a:fld>
             <a:endParaRPr lang="ru-UA"/>
           </a:p>
@@ -10659,7 +10697,7 @@
           <a:p>
             <a:fld id="{1F2BFE26-4FED-4D5D-839E-F86C02A0117E}" type="datetime1">
               <a:rPr lang="ru-UA" smtClean="0"/>
-              <a:t>07.02.2024</a:t>
+              <a:t>08.02.2024</a:t>
             </a:fld>
             <a:endParaRPr lang="ru-UA"/>
           </a:p>
@@ -10863,7 +10901,7 @@
           <a:p>
             <a:fld id="{825839E9-12AD-453D-BFE5-5792C230002C}" type="datetime1">
               <a:rPr lang="ru-UA" smtClean="0"/>
-              <a:t>07.02.2024</a:t>
+              <a:t>08.02.2024</a:t>
             </a:fld>
             <a:endParaRPr lang="ru-UA"/>
           </a:p>
@@ -11089,7 +11127,7 @@
           <a:p>
             <a:fld id="{75F547B3-1F31-4172-92E1-D22EF1F95E8C}" type="datetime1">
               <a:rPr lang="ru-UA" smtClean="0"/>
-              <a:t>07.02.2024</a:t>
+              <a:t>08.02.2024</a:t>
             </a:fld>
             <a:endParaRPr lang="ru-UA"/>
           </a:p>
@@ -11293,7 +11331,7 @@
           <a:p>
             <a:fld id="{24E64129-F663-4612-9389-523FDF87B3F0}" type="datetime1">
               <a:rPr lang="ru-UA" smtClean="0"/>
-              <a:t>07.02.2024</a:t>
+              <a:t>08.02.2024</a:t>
             </a:fld>
             <a:endParaRPr lang="ru-UA"/>
           </a:p>
@@ -11573,7 +11611,7 @@
           <a:p>
             <a:fld id="{218AB4DE-D99C-4E0E-9875-8EA9F9A16E97}" type="datetime1">
               <a:rPr lang="ru-UA" smtClean="0"/>
-              <a:t>07.02.2024</a:t>
+              <a:t>08.02.2024</a:t>
             </a:fld>
             <a:endParaRPr lang="ru-UA"/>
           </a:p>
@@ -11845,7 +11883,7 @@
           <a:p>
             <a:fld id="{BFCCBACA-8C88-4644-800A-7DDB16C53576}" type="datetime1">
               <a:rPr lang="ru-UA" smtClean="0"/>
-              <a:t>07.02.2024</a:t>
+              <a:t>08.02.2024</a:t>
             </a:fld>
             <a:endParaRPr lang="ru-UA"/>
           </a:p>
@@ -12264,7 +12302,7 @@
           <a:p>
             <a:fld id="{15E1D314-2097-4A79-969F-1E34685EA335}" type="datetime1">
               <a:rPr lang="ru-UA" smtClean="0"/>
-              <a:t>07.02.2024</a:t>
+              <a:t>08.02.2024</a:t>
             </a:fld>
             <a:endParaRPr lang="ru-UA"/>
           </a:p>
@@ -12410,7 +12448,7 @@
           <a:p>
             <a:fld id="{8798474C-92F2-4143-AFFB-63EE3C597E8E}" type="datetime1">
               <a:rPr lang="ru-UA" smtClean="0"/>
-              <a:t>07.02.2024</a:t>
+              <a:t>08.02.2024</a:t>
             </a:fld>
             <a:endParaRPr lang="ru-UA"/>
           </a:p>
@@ -12527,7 +12565,7 @@
           <a:p>
             <a:fld id="{1D3DF002-33AA-483D-AD5C-E2C4CEBAD152}" type="datetime1">
               <a:rPr lang="ru-UA" smtClean="0"/>
-              <a:t>07.02.2024</a:t>
+              <a:t>08.02.2024</a:t>
             </a:fld>
             <a:endParaRPr lang="ru-UA"/>
           </a:p>
@@ -12844,7 +12882,7 @@
           <a:p>
             <a:fld id="{E7B28D05-AD97-402E-B624-C9D82E7F086B}" type="datetime1">
               <a:rPr lang="ru-UA" smtClean="0"/>
-              <a:t>07.02.2024</a:t>
+              <a:t>08.02.2024</a:t>
             </a:fld>
             <a:endParaRPr lang="ru-UA"/>
           </a:p>
@@ -13137,7 +13175,7 @@
           <a:p>
             <a:fld id="{5972F662-588E-465B-8CD0-9379DC5A6EBA}" type="datetime1">
               <a:rPr lang="ru-UA" smtClean="0"/>
-              <a:t>07.02.2024</a:t>
+              <a:t>08.02.2024</a:t>
             </a:fld>
             <a:endParaRPr lang="ru-UA"/>
           </a:p>
@@ -13384,7 +13422,7 @@
           <a:p>
             <a:fld id="{25BB0A93-9CE5-4D82-814D-008F65052A37}" type="datetime1">
               <a:rPr lang="ru-UA" smtClean="0"/>
-              <a:t>07.02.2024</a:t>
+              <a:t>08.02.2024</a:t>
             </a:fld>
             <a:endParaRPr lang="ru-UA"/>
           </a:p>
@@ -13959,7 +13997,7 @@
           <a:p>
             <a:fld id="{DBE20612-FB23-4755-AE1A-B67DD96FA1F9}" type="datetime1">
               <a:rPr lang="ru-UA" smtClean="0"/>
-              <a:t>07.02.2024</a:t>
+              <a:t>08.02.2024</a:t>
             </a:fld>
             <a:endParaRPr lang="ru-UA"/>
           </a:p>
@@ -16623,6 +16661,232 @@
 </p:sld>
 </file>
 
+<file path=ppt/slides/slide19.xml><?xml version="1.0" encoding="utf-8"?>
+<p:sld xmlns:a="http://schemas.openxmlformats.org/drawingml/2006/main" xmlns:r="http://schemas.openxmlformats.org/officeDocument/2006/relationships" xmlns:p="http://schemas.openxmlformats.org/presentationml/2006/main">
+  <p:cSld>
+    <p:bg>
+      <p:bgPr>
+        <a:solidFill>
+          <a:schemeClr val="bg1"/>
+        </a:solidFill>
+        <a:effectLst/>
+      </p:bgPr>
+    </p:bg>
+    <p:spTree>
+      <p:nvGrpSpPr>
+        <p:cNvPr id="1" name=""/>
+        <p:cNvGrpSpPr/>
+        <p:nvPr/>
+      </p:nvGrpSpPr>
+      <p:grpSpPr>
+        <a:xfrm>
+          <a:off x="0" y="0"/>
+          <a:ext cx="0" cy="0"/>
+          <a:chOff x="0" y="0"/>
+          <a:chExt cx="0" cy="0"/>
+        </a:xfrm>
+      </p:grpSpPr>
+      <p:sp>
+        <p:nvSpPr>
+          <p:cNvPr id="24" name="Down Arrow 7">
+            <a:extLst>
+              <a:ext uri="{FF2B5EF4-FFF2-40B4-BE49-F238E27FC236}">
+                <a16:creationId xmlns:a16="http://schemas.microsoft.com/office/drawing/2014/main" id="{D4771268-CB57-404A-9271-370EB28F6090}"/>
+              </a:ext>
+              <a:ext uri="{C183D7F6-B498-43B3-948B-1728B52AA6E4}">
+                <adec:decorative xmlns:adec="http://schemas.microsoft.com/office/drawing/2017/decorative" val="1"/>
+              </a:ext>
+            </a:extLst>
+          </p:cNvPr>
+          <p:cNvSpPr>
+            <a:spLocks noGrp="1" noRot="1" noChangeAspect="1" noMove="1" noResize="1" noEditPoints="1" noAdjustHandles="1" noChangeArrowheads="1" noChangeShapeType="1" noTextEdit="1"/>
+          </p:cNvSpPr>
+          <p:nvPr>
+            <p:extLst>
+              <p:ext uri="{386F3935-93C4-4BCD-93E2-E3B085C9AB24}">
+                <p16:designElem xmlns:p16="http://schemas.microsoft.com/office/powerpoint/2015/main" val="1"/>
+              </p:ext>
+            </p:extLst>
+          </p:nvPr>
+        </p:nvSpPr>
+        <p:spPr>
+          <a:xfrm rot="16200000">
+            <a:off x="800100" y="1491343"/>
+            <a:ext cx="3333749" cy="3499103"/>
+          </a:xfrm>
+          <a:prstGeom prst="downArrow">
+            <a:avLst>
+              <a:gd name="adj1" fmla="val 100000"/>
+              <a:gd name="adj2" fmla="val 15788"/>
+            </a:avLst>
+          </a:prstGeom>
+          <a:solidFill>
+            <a:srgbClr val="404040"/>
+          </a:solidFill>
+          <a:ln w="53975">
+            <a:noFill/>
+          </a:ln>
+        </p:spPr>
+        <p:style>
+          <a:lnRef idx="2">
+            <a:schemeClr val="accent1">
+              <a:shade val="50000"/>
+            </a:schemeClr>
+          </a:lnRef>
+          <a:fillRef idx="1">
+            <a:schemeClr val="accent1"/>
+          </a:fillRef>
+          <a:effectRef idx="0">
+            <a:schemeClr val="accent1"/>
+          </a:effectRef>
+          <a:fontRef idx="minor">
+            <a:schemeClr val="lt1"/>
+          </a:fontRef>
+        </p:style>
+        <p:txBody>
+          <a:bodyPr rtlCol="0" anchor="ctr"/>
+          <a:lstStyle/>
+          <a:p>
+            <a:pPr algn="ctr"/>
+            <a:endParaRPr lang="en-US"/>
+          </a:p>
+        </p:txBody>
+      </p:sp>
+      <p:sp>
+        <p:nvSpPr>
+          <p:cNvPr id="2" name="Title 1">
+            <a:extLst>
+              <a:ext uri="{FF2B5EF4-FFF2-40B4-BE49-F238E27FC236}">
+                <a16:creationId xmlns:a16="http://schemas.microsoft.com/office/drawing/2014/main" id="{53C5D828-9666-E312-B574-9FE965A7D6BE}"/>
+              </a:ext>
+            </a:extLst>
+          </p:cNvPr>
+          <p:cNvSpPr>
+            <a:spLocks noGrp="1"/>
+          </p:cNvSpPr>
+          <p:nvPr>
+            <p:ph type="title"/>
+          </p:nvPr>
+        </p:nvSpPr>
+        <p:spPr>
+          <a:xfrm>
+            <a:off x="900545" y="1967266"/>
+            <a:ext cx="2743200" cy="2547257"/>
+          </a:xfrm>
+          <a:noFill/>
+        </p:spPr>
+        <p:txBody>
+          <a:bodyPr vert="horz" lIns="91440" tIns="45720" rIns="91440" bIns="45720" rtlCol="0" anchor="ctr">
+            <a:normAutofit/>
+          </a:bodyPr>
+          <a:lstStyle/>
+          <a:p>
+            <a:pPr algn="ctr"/>
+            <a:r>
+              <a:rPr lang="en-US" sz="3600" kern="1200" dirty="0">
+                <a:solidFill>
+                  <a:srgbClr val="FFFFFF"/>
+                </a:solidFill>
+                <a:latin typeface="+mj-lt"/>
+                <a:ea typeface="+mj-ea"/>
+                <a:cs typeface="+mj-cs"/>
+              </a:rPr>
+              <a:t>Kubernetes – </a:t>
+            </a:r>
+            <a:r>
+              <a:rPr lang="en-US" sz="3600" dirty="0">
+                <a:solidFill>
+                  <a:srgbClr val="FFFFFF"/>
+                </a:solidFill>
+              </a:rPr>
+              <a:t>Secret</a:t>
+            </a:r>
+            <a:r>
+              <a:rPr lang="en-US" sz="3600" kern="1200" dirty="0">
+                <a:solidFill>
+                  <a:srgbClr val="FFFFFF"/>
+                </a:solidFill>
+                <a:latin typeface="+mj-lt"/>
+                <a:ea typeface="+mj-ea"/>
+                <a:cs typeface="+mj-cs"/>
+              </a:rPr>
+              <a:t>s</a:t>
+            </a:r>
+          </a:p>
+        </p:txBody>
+      </p:sp>
+      <p:sp>
+        <p:nvSpPr>
+          <p:cNvPr id="3" name="Footer Placeholder 2">
+            <a:extLst>
+              <a:ext uri="{FF2B5EF4-FFF2-40B4-BE49-F238E27FC236}">
+                <a16:creationId xmlns:a16="http://schemas.microsoft.com/office/drawing/2014/main" id="{5AA19FA0-A765-8169-03F1-928E3EF7B595}"/>
+              </a:ext>
+            </a:extLst>
+          </p:cNvPr>
+          <p:cNvSpPr>
+            <a:spLocks noGrp="1"/>
+          </p:cNvSpPr>
+          <p:nvPr>
+            <p:ph type="ftr" sz="quarter" idx="11"/>
+          </p:nvPr>
+        </p:nvSpPr>
+        <p:spPr/>
+        <p:txBody>
+          <a:bodyPr/>
+          <a:lstStyle/>
+          <a:p>
+            <a:r>
+              <a:rPr lang="pt-BR"/>
+              <a:t>Step 8. Kubernetes - ver. 1</a:t>
+            </a:r>
+            <a:endParaRPr lang="ru-UA"/>
+          </a:p>
+        </p:txBody>
+      </p:sp>
+      <p:pic>
+        <p:nvPicPr>
+          <p:cNvPr id="5" name="Picture 4">
+            <a:extLst>
+              <a:ext uri="{FF2B5EF4-FFF2-40B4-BE49-F238E27FC236}">
+                <a16:creationId xmlns:a16="http://schemas.microsoft.com/office/drawing/2014/main" id="{5F1C87C8-7726-14B1-9228-199C17B05F5E}"/>
+              </a:ext>
+            </a:extLst>
+          </p:cNvPr>
+          <p:cNvPicPr>
+            <a:picLocks noChangeAspect="1"/>
+          </p:cNvPicPr>
+          <p:nvPr/>
+        </p:nvPicPr>
+        <p:blipFill>
+          <a:blip r:embed="rId2"/>
+          <a:stretch>
+            <a:fillRect/>
+          </a:stretch>
+        </p:blipFill>
+        <p:spPr>
+          <a:xfrm>
+            <a:off x="6615545" y="1393044"/>
+            <a:ext cx="3810000" cy="3695700"/>
+          </a:xfrm>
+          <a:prstGeom prst="rect">
+            <a:avLst/>
+          </a:prstGeom>
+        </p:spPr>
+      </p:pic>
+    </p:spTree>
+    <p:extLst>
+      <p:ext uri="{BB962C8B-B14F-4D97-AF65-F5344CB8AC3E}">
+        <p14:creationId xmlns:p14="http://schemas.microsoft.com/office/powerpoint/2010/main" val="2438032746"/>
+      </p:ext>
+    </p:extLst>
+  </p:cSld>
+  <p:clrMapOvr>
+    <a:masterClrMapping/>
+  </p:clrMapOvr>
+</p:sld>
+</file>
+
 <file path=ppt/slides/slide2.xml><?xml version="1.0" encoding="utf-8"?>
 <p:sld xmlns:a="http://schemas.openxmlformats.org/drawingml/2006/main" xmlns:r="http://schemas.openxmlformats.org/officeDocument/2006/relationships" xmlns:p="http://schemas.openxmlformats.org/presentationml/2006/main">
   <p:cSld>
@@ -16951,14 +17215,14 @@
             <p:ph idx="1"/>
             <p:extLst>
               <p:ext uri="{D42A27DB-BD31-4B8C-83A1-F6EECF244321}">
-                <p14:modId xmlns:p14="http://schemas.microsoft.com/office/powerpoint/2010/main" val="3649246853"/>
+                <p14:modId xmlns:p14="http://schemas.microsoft.com/office/powerpoint/2010/main" val="1567542733"/>
               </p:ext>
             </p:extLst>
           </p:nvPr>
         </p:nvGraphicFramePr>
         <p:xfrm>
-          <a:off x="4654732" y="1482436"/>
-          <a:ext cx="6390623" cy="3505200"/>
+          <a:off x="4654732" y="2453640"/>
+          <a:ext cx="6390623" cy="1629295"/>
         </p:xfrm>
         <a:graphic>
           <a:graphicData uri="http://schemas.openxmlformats.org/drawingml/2006/diagram">
@@ -16970,6 +17234,675 @@
     <p:extLst>
       <p:ext uri="{BB962C8B-B14F-4D97-AF65-F5344CB8AC3E}">
         <p14:creationId xmlns:p14="http://schemas.microsoft.com/office/powerpoint/2010/main" val="2972731808"/>
+      </p:ext>
+    </p:extLst>
+  </p:cSld>
+  <p:clrMapOvr>
+    <a:masterClrMapping/>
+  </p:clrMapOvr>
+</p:sld>
+</file>
+
+<file path=ppt/slides/slide20.xml><?xml version="1.0" encoding="utf-8"?>
+<p:sld xmlns:a="http://schemas.openxmlformats.org/drawingml/2006/main" xmlns:r="http://schemas.openxmlformats.org/officeDocument/2006/relationships" xmlns:p="http://schemas.openxmlformats.org/presentationml/2006/main">
+  <p:cSld>
+    <p:bg>
+      <p:bgPr>
+        <a:solidFill>
+          <a:schemeClr val="bg1"/>
+        </a:solidFill>
+        <a:effectLst/>
+      </p:bgPr>
+    </p:bg>
+    <p:spTree>
+      <p:nvGrpSpPr>
+        <p:cNvPr id="1" name=""/>
+        <p:cNvGrpSpPr/>
+        <p:nvPr/>
+      </p:nvGrpSpPr>
+      <p:grpSpPr>
+        <a:xfrm>
+          <a:off x="0" y="0"/>
+          <a:ext cx="0" cy="0"/>
+          <a:chOff x="0" y="0"/>
+          <a:chExt cx="0" cy="0"/>
+        </a:xfrm>
+      </p:grpSpPr>
+      <p:sp>
+        <p:nvSpPr>
+          <p:cNvPr id="24" name="Down Arrow 7">
+            <a:extLst>
+              <a:ext uri="{FF2B5EF4-FFF2-40B4-BE49-F238E27FC236}">
+                <a16:creationId xmlns:a16="http://schemas.microsoft.com/office/drawing/2014/main" id="{D4771268-CB57-404A-9271-370EB28F6090}"/>
+              </a:ext>
+              <a:ext uri="{C183D7F6-B498-43B3-948B-1728B52AA6E4}">
+                <adec:decorative xmlns:adec="http://schemas.microsoft.com/office/drawing/2017/decorative" val="1"/>
+              </a:ext>
+            </a:extLst>
+          </p:cNvPr>
+          <p:cNvSpPr>
+            <a:spLocks noGrp="1" noRot="1" noChangeAspect="1" noMove="1" noResize="1" noEditPoints="1" noAdjustHandles="1" noChangeArrowheads="1" noChangeShapeType="1" noTextEdit="1"/>
+          </p:cNvSpPr>
+          <p:nvPr>
+            <p:extLst>
+              <p:ext uri="{386F3935-93C4-4BCD-93E2-E3B085C9AB24}">
+                <p16:designElem xmlns:p16="http://schemas.microsoft.com/office/powerpoint/2015/main" val="1"/>
+              </p:ext>
+            </p:extLst>
+          </p:nvPr>
+        </p:nvSpPr>
+        <p:spPr>
+          <a:xfrm rot="16200000">
+            <a:off x="800100" y="1491343"/>
+            <a:ext cx="3333749" cy="3499103"/>
+          </a:xfrm>
+          <a:prstGeom prst="downArrow">
+            <a:avLst>
+              <a:gd name="adj1" fmla="val 100000"/>
+              <a:gd name="adj2" fmla="val 15788"/>
+            </a:avLst>
+          </a:prstGeom>
+          <a:solidFill>
+            <a:srgbClr val="404040"/>
+          </a:solidFill>
+          <a:ln w="53975">
+            <a:noFill/>
+          </a:ln>
+        </p:spPr>
+        <p:style>
+          <a:lnRef idx="2">
+            <a:schemeClr val="accent1">
+              <a:shade val="50000"/>
+            </a:schemeClr>
+          </a:lnRef>
+          <a:fillRef idx="1">
+            <a:schemeClr val="accent1"/>
+          </a:fillRef>
+          <a:effectRef idx="0">
+            <a:schemeClr val="accent1"/>
+          </a:effectRef>
+          <a:fontRef idx="minor">
+            <a:schemeClr val="lt1"/>
+          </a:fontRef>
+        </p:style>
+        <p:txBody>
+          <a:bodyPr rtlCol="0" anchor="ctr"/>
+          <a:lstStyle/>
+          <a:p>
+            <a:pPr algn="ctr"/>
+            <a:endParaRPr lang="en-US"/>
+          </a:p>
+        </p:txBody>
+      </p:sp>
+      <p:sp>
+        <p:nvSpPr>
+          <p:cNvPr id="2" name="Title 1">
+            <a:extLst>
+              <a:ext uri="{FF2B5EF4-FFF2-40B4-BE49-F238E27FC236}">
+                <a16:creationId xmlns:a16="http://schemas.microsoft.com/office/drawing/2014/main" id="{53C5D828-9666-E312-B574-9FE965A7D6BE}"/>
+              </a:ext>
+            </a:extLst>
+          </p:cNvPr>
+          <p:cNvSpPr>
+            <a:spLocks noGrp="1"/>
+          </p:cNvSpPr>
+          <p:nvPr>
+            <p:ph type="title"/>
+          </p:nvPr>
+        </p:nvSpPr>
+        <p:spPr>
+          <a:xfrm>
+            <a:off x="900545" y="1967266"/>
+            <a:ext cx="2743200" cy="2547257"/>
+          </a:xfrm>
+          <a:noFill/>
+        </p:spPr>
+        <p:txBody>
+          <a:bodyPr vert="horz" lIns="91440" tIns="45720" rIns="91440" bIns="45720" rtlCol="0" anchor="ctr">
+            <a:normAutofit/>
+          </a:bodyPr>
+          <a:lstStyle/>
+          <a:p>
+            <a:pPr algn="ctr"/>
+            <a:r>
+              <a:rPr lang="en-US" sz="3600" kern="1200" dirty="0">
+                <a:solidFill>
+                  <a:srgbClr val="FFFFFF"/>
+                </a:solidFill>
+                <a:latin typeface="+mj-lt"/>
+                <a:ea typeface="+mj-ea"/>
+                <a:cs typeface="+mj-cs"/>
+              </a:rPr>
+              <a:t>Kubernetes – </a:t>
+            </a:r>
+            <a:r>
+              <a:rPr lang="en-US" sz="3600" dirty="0">
+                <a:solidFill>
+                  <a:srgbClr val="FFFFFF"/>
+                </a:solidFill>
+              </a:rPr>
+              <a:t>Load Balancing Service</a:t>
+            </a:r>
+            <a:endParaRPr lang="en-US" sz="3600" kern="1200" dirty="0">
+              <a:solidFill>
+                <a:srgbClr val="FFFFFF"/>
+              </a:solidFill>
+              <a:latin typeface="+mj-lt"/>
+              <a:ea typeface="+mj-ea"/>
+              <a:cs typeface="+mj-cs"/>
+            </a:endParaRPr>
+          </a:p>
+        </p:txBody>
+      </p:sp>
+      <p:sp>
+        <p:nvSpPr>
+          <p:cNvPr id="3" name="Footer Placeholder 2">
+            <a:extLst>
+              <a:ext uri="{FF2B5EF4-FFF2-40B4-BE49-F238E27FC236}">
+                <a16:creationId xmlns:a16="http://schemas.microsoft.com/office/drawing/2014/main" id="{5AA19FA0-A765-8169-03F1-928E3EF7B595}"/>
+              </a:ext>
+            </a:extLst>
+          </p:cNvPr>
+          <p:cNvSpPr>
+            <a:spLocks noGrp="1"/>
+          </p:cNvSpPr>
+          <p:nvPr>
+            <p:ph type="ftr" sz="quarter" idx="11"/>
+          </p:nvPr>
+        </p:nvSpPr>
+        <p:spPr/>
+        <p:txBody>
+          <a:bodyPr/>
+          <a:lstStyle/>
+          <a:p>
+            <a:r>
+              <a:rPr lang="pt-BR"/>
+              <a:t>Step 8. Kubernetes - ver. 1</a:t>
+            </a:r>
+            <a:endParaRPr lang="ru-UA"/>
+          </a:p>
+        </p:txBody>
+      </p:sp>
+      <p:pic>
+        <p:nvPicPr>
+          <p:cNvPr id="10" name="Picture 9">
+            <a:extLst>
+              <a:ext uri="{FF2B5EF4-FFF2-40B4-BE49-F238E27FC236}">
+                <a16:creationId xmlns:a16="http://schemas.microsoft.com/office/drawing/2014/main" id="{AFD23CF5-0199-8B30-1BE1-D9E6989A351D}"/>
+              </a:ext>
+            </a:extLst>
+          </p:cNvPr>
+          <p:cNvPicPr>
+            <a:picLocks noChangeAspect="1"/>
+          </p:cNvPicPr>
+          <p:nvPr/>
+        </p:nvPicPr>
+        <p:blipFill>
+          <a:blip r:embed="rId2"/>
+          <a:stretch>
+            <a:fillRect/>
+          </a:stretch>
+        </p:blipFill>
+        <p:spPr>
+          <a:xfrm>
+            <a:off x="6432338" y="1340491"/>
+            <a:ext cx="3695335" cy="3567278"/>
+          </a:xfrm>
+          <a:prstGeom prst="rect">
+            <a:avLst/>
+          </a:prstGeom>
+        </p:spPr>
+      </p:pic>
+    </p:spTree>
+    <p:extLst>
+      <p:ext uri="{BB962C8B-B14F-4D97-AF65-F5344CB8AC3E}">
+        <p14:creationId xmlns:p14="http://schemas.microsoft.com/office/powerpoint/2010/main" val="2779841426"/>
+      </p:ext>
+    </p:extLst>
+  </p:cSld>
+  <p:clrMapOvr>
+    <a:masterClrMapping/>
+  </p:clrMapOvr>
+</p:sld>
+</file>
+
+<file path=ppt/slides/slide21.xml><?xml version="1.0" encoding="utf-8"?>
+<p:sld xmlns:a="http://schemas.openxmlformats.org/drawingml/2006/main" xmlns:r="http://schemas.openxmlformats.org/officeDocument/2006/relationships" xmlns:p="http://schemas.openxmlformats.org/presentationml/2006/main">
+  <p:cSld>
+    <p:bg>
+      <p:bgPr>
+        <a:solidFill>
+          <a:schemeClr val="bg1"/>
+        </a:solidFill>
+        <a:effectLst/>
+      </p:bgPr>
+    </p:bg>
+    <p:spTree>
+      <p:nvGrpSpPr>
+        <p:cNvPr id="1" name=""/>
+        <p:cNvGrpSpPr/>
+        <p:nvPr/>
+      </p:nvGrpSpPr>
+      <p:grpSpPr>
+        <a:xfrm>
+          <a:off x="0" y="0"/>
+          <a:ext cx="0" cy="0"/>
+          <a:chOff x="0" y="0"/>
+          <a:chExt cx="0" cy="0"/>
+        </a:xfrm>
+      </p:grpSpPr>
+      <p:sp>
+        <p:nvSpPr>
+          <p:cNvPr id="24" name="Down Arrow 7">
+            <a:extLst>
+              <a:ext uri="{FF2B5EF4-FFF2-40B4-BE49-F238E27FC236}">
+                <a16:creationId xmlns:a16="http://schemas.microsoft.com/office/drawing/2014/main" id="{D4771268-CB57-404A-9271-370EB28F6090}"/>
+              </a:ext>
+              <a:ext uri="{C183D7F6-B498-43B3-948B-1728B52AA6E4}">
+                <adec:decorative xmlns:adec="http://schemas.microsoft.com/office/drawing/2017/decorative" val="1"/>
+              </a:ext>
+            </a:extLst>
+          </p:cNvPr>
+          <p:cNvSpPr>
+            <a:spLocks noGrp="1" noRot="1" noChangeAspect="1" noMove="1" noResize="1" noEditPoints="1" noAdjustHandles="1" noChangeArrowheads="1" noChangeShapeType="1" noTextEdit="1"/>
+          </p:cNvSpPr>
+          <p:nvPr>
+            <p:extLst>
+              <p:ext uri="{386F3935-93C4-4BCD-93E2-E3B085C9AB24}">
+                <p16:designElem xmlns:p16="http://schemas.microsoft.com/office/powerpoint/2015/main" val="1"/>
+              </p:ext>
+            </p:extLst>
+          </p:nvPr>
+        </p:nvSpPr>
+        <p:spPr>
+          <a:xfrm rot="16200000">
+            <a:off x="800100" y="1491343"/>
+            <a:ext cx="3333749" cy="3499103"/>
+          </a:xfrm>
+          <a:prstGeom prst="downArrow">
+            <a:avLst>
+              <a:gd name="adj1" fmla="val 100000"/>
+              <a:gd name="adj2" fmla="val 15788"/>
+            </a:avLst>
+          </a:prstGeom>
+          <a:solidFill>
+            <a:srgbClr val="404040"/>
+          </a:solidFill>
+          <a:ln w="53975">
+            <a:noFill/>
+          </a:ln>
+        </p:spPr>
+        <p:style>
+          <a:lnRef idx="2">
+            <a:schemeClr val="accent1">
+              <a:shade val="50000"/>
+            </a:schemeClr>
+          </a:lnRef>
+          <a:fillRef idx="1">
+            <a:schemeClr val="accent1"/>
+          </a:fillRef>
+          <a:effectRef idx="0">
+            <a:schemeClr val="accent1"/>
+          </a:effectRef>
+          <a:fontRef idx="minor">
+            <a:schemeClr val="lt1"/>
+          </a:fontRef>
+        </p:style>
+        <p:txBody>
+          <a:bodyPr rtlCol="0" anchor="ctr"/>
+          <a:lstStyle/>
+          <a:p>
+            <a:pPr algn="ctr"/>
+            <a:endParaRPr lang="en-US"/>
+          </a:p>
+        </p:txBody>
+      </p:sp>
+      <p:sp>
+        <p:nvSpPr>
+          <p:cNvPr id="2" name="Title 1">
+            <a:extLst>
+              <a:ext uri="{FF2B5EF4-FFF2-40B4-BE49-F238E27FC236}">
+                <a16:creationId xmlns:a16="http://schemas.microsoft.com/office/drawing/2014/main" id="{53C5D828-9666-E312-B574-9FE965A7D6BE}"/>
+              </a:ext>
+            </a:extLst>
+          </p:cNvPr>
+          <p:cNvSpPr>
+            <a:spLocks noGrp="1"/>
+          </p:cNvSpPr>
+          <p:nvPr>
+            <p:ph type="title"/>
+          </p:nvPr>
+        </p:nvSpPr>
+        <p:spPr>
+          <a:xfrm>
+            <a:off x="900545" y="1967266"/>
+            <a:ext cx="2743200" cy="2547257"/>
+          </a:xfrm>
+          <a:noFill/>
+        </p:spPr>
+        <p:txBody>
+          <a:bodyPr vert="horz" lIns="91440" tIns="45720" rIns="91440" bIns="45720" rtlCol="0" anchor="ctr">
+            <a:normAutofit/>
+          </a:bodyPr>
+          <a:lstStyle/>
+          <a:p>
+            <a:pPr algn="ctr"/>
+            <a:r>
+              <a:rPr lang="en-US" sz="3600" kern="1200" dirty="0">
+                <a:solidFill>
+                  <a:srgbClr val="FFFFFF"/>
+                </a:solidFill>
+                <a:latin typeface="+mj-lt"/>
+                <a:ea typeface="+mj-ea"/>
+                <a:cs typeface="+mj-cs"/>
+              </a:rPr>
+              <a:t>Kubernetes – </a:t>
+            </a:r>
+            <a:r>
+              <a:rPr lang="en-US" sz="3600" dirty="0">
+                <a:solidFill>
+                  <a:srgbClr val="FFFFFF"/>
+                </a:solidFill>
+              </a:rPr>
+              <a:t>Service DNS</a:t>
+            </a:r>
+            <a:endParaRPr lang="en-US" sz="3600" kern="1200" dirty="0">
+              <a:solidFill>
+                <a:srgbClr val="FFFFFF"/>
+              </a:solidFill>
+              <a:latin typeface="+mj-lt"/>
+              <a:ea typeface="+mj-ea"/>
+              <a:cs typeface="+mj-cs"/>
+            </a:endParaRPr>
+          </a:p>
+        </p:txBody>
+      </p:sp>
+      <p:sp>
+        <p:nvSpPr>
+          <p:cNvPr id="3" name="Footer Placeholder 2">
+            <a:extLst>
+              <a:ext uri="{FF2B5EF4-FFF2-40B4-BE49-F238E27FC236}">
+                <a16:creationId xmlns:a16="http://schemas.microsoft.com/office/drawing/2014/main" id="{5AA19FA0-A765-8169-03F1-928E3EF7B595}"/>
+              </a:ext>
+            </a:extLst>
+          </p:cNvPr>
+          <p:cNvSpPr>
+            <a:spLocks noGrp="1"/>
+          </p:cNvSpPr>
+          <p:nvPr>
+            <p:ph type="ftr" sz="quarter" idx="11"/>
+          </p:nvPr>
+        </p:nvSpPr>
+        <p:spPr/>
+        <p:txBody>
+          <a:bodyPr/>
+          <a:lstStyle/>
+          <a:p>
+            <a:r>
+              <a:rPr lang="pt-BR"/>
+              <a:t>Step 8. Kubernetes - ver. 1</a:t>
+            </a:r>
+            <a:endParaRPr lang="ru-UA"/>
+          </a:p>
+        </p:txBody>
+      </p:sp>
+      <p:pic>
+        <p:nvPicPr>
+          <p:cNvPr id="5" name="Picture 4">
+            <a:extLst>
+              <a:ext uri="{FF2B5EF4-FFF2-40B4-BE49-F238E27FC236}">
+                <a16:creationId xmlns:a16="http://schemas.microsoft.com/office/drawing/2014/main" id="{973C29E6-2B0E-84B0-7B5B-A426B0585B3F}"/>
+              </a:ext>
+            </a:extLst>
+          </p:cNvPr>
+          <p:cNvPicPr>
+            <a:picLocks noChangeAspect="1"/>
+          </p:cNvPicPr>
+          <p:nvPr/>
+        </p:nvPicPr>
+        <p:blipFill>
+          <a:blip r:embed="rId2"/>
+          <a:stretch>
+            <a:fillRect/>
+          </a:stretch>
+        </p:blipFill>
+        <p:spPr>
+          <a:xfrm>
+            <a:off x="4399649" y="1828721"/>
+            <a:ext cx="7536873" cy="2854792"/>
+          </a:xfrm>
+          <a:prstGeom prst="rect">
+            <a:avLst/>
+          </a:prstGeom>
+        </p:spPr>
+      </p:pic>
+    </p:spTree>
+    <p:extLst>
+      <p:ext uri="{BB962C8B-B14F-4D97-AF65-F5344CB8AC3E}">
+        <p14:creationId xmlns:p14="http://schemas.microsoft.com/office/powerpoint/2010/main" val="4159126741"/>
+      </p:ext>
+    </p:extLst>
+  </p:cSld>
+  <p:clrMapOvr>
+    <a:masterClrMapping/>
+  </p:clrMapOvr>
+</p:sld>
+</file>
+
+<file path=ppt/slides/slide22.xml><?xml version="1.0" encoding="utf-8"?>
+<p:sld xmlns:a="http://schemas.openxmlformats.org/drawingml/2006/main" xmlns:r="http://schemas.openxmlformats.org/officeDocument/2006/relationships" xmlns:p="http://schemas.openxmlformats.org/presentationml/2006/main">
+  <p:cSld>
+    <p:bg>
+      <p:bgPr>
+        <a:solidFill>
+          <a:schemeClr val="bg1"/>
+        </a:solidFill>
+        <a:effectLst/>
+      </p:bgPr>
+    </p:bg>
+    <p:spTree>
+      <p:nvGrpSpPr>
+        <p:cNvPr id="1" name=""/>
+        <p:cNvGrpSpPr/>
+        <p:nvPr/>
+      </p:nvGrpSpPr>
+      <p:grpSpPr>
+        <a:xfrm>
+          <a:off x="0" y="0"/>
+          <a:ext cx="0" cy="0"/>
+          <a:chOff x="0" y="0"/>
+          <a:chExt cx="0" cy="0"/>
+        </a:xfrm>
+      </p:grpSpPr>
+      <p:sp>
+        <p:nvSpPr>
+          <p:cNvPr id="24" name="Down Arrow 7">
+            <a:extLst>
+              <a:ext uri="{FF2B5EF4-FFF2-40B4-BE49-F238E27FC236}">
+                <a16:creationId xmlns:a16="http://schemas.microsoft.com/office/drawing/2014/main" id="{D4771268-CB57-404A-9271-370EB28F6090}"/>
+              </a:ext>
+              <a:ext uri="{C183D7F6-B498-43B3-948B-1728B52AA6E4}">
+                <adec:decorative xmlns:adec="http://schemas.microsoft.com/office/drawing/2017/decorative" val="1"/>
+              </a:ext>
+            </a:extLst>
+          </p:cNvPr>
+          <p:cNvSpPr>
+            <a:spLocks noGrp="1" noRot="1" noChangeAspect="1" noMove="1" noResize="1" noEditPoints="1" noAdjustHandles="1" noChangeArrowheads="1" noChangeShapeType="1" noTextEdit="1"/>
+          </p:cNvSpPr>
+          <p:nvPr>
+            <p:extLst>
+              <p:ext uri="{386F3935-93C4-4BCD-93E2-E3B085C9AB24}">
+                <p16:designElem xmlns:p16="http://schemas.microsoft.com/office/powerpoint/2015/main" val="1"/>
+              </p:ext>
+            </p:extLst>
+          </p:nvPr>
+        </p:nvSpPr>
+        <p:spPr>
+          <a:xfrm rot="16200000">
+            <a:off x="800100" y="1491343"/>
+            <a:ext cx="3333749" cy="3499103"/>
+          </a:xfrm>
+          <a:prstGeom prst="downArrow">
+            <a:avLst>
+              <a:gd name="adj1" fmla="val 100000"/>
+              <a:gd name="adj2" fmla="val 15788"/>
+            </a:avLst>
+          </a:prstGeom>
+          <a:solidFill>
+            <a:srgbClr val="404040"/>
+          </a:solidFill>
+          <a:ln w="53975">
+            <a:noFill/>
+          </a:ln>
+        </p:spPr>
+        <p:style>
+          <a:lnRef idx="2">
+            <a:schemeClr val="accent1">
+              <a:shade val="50000"/>
+            </a:schemeClr>
+          </a:lnRef>
+          <a:fillRef idx="1">
+            <a:schemeClr val="accent1"/>
+          </a:fillRef>
+          <a:effectRef idx="0">
+            <a:schemeClr val="accent1"/>
+          </a:effectRef>
+          <a:fontRef idx="minor">
+            <a:schemeClr val="lt1"/>
+          </a:fontRef>
+        </p:style>
+        <p:txBody>
+          <a:bodyPr rtlCol="0" anchor="ctr"/>
+          <a:lstStyle/>
+          <a:p>
+            <a:pPr algn="ctr"/>
+            <a:endParaRPr lang="en-US"/>
+          </a:p>
+        </p:txBody>
+      </p:sp>
+      <p:sp>
+        <p:nvSpPr>
+          <p:cNvPr id="2" name="Title 1">
+            <a:extLst>
+              <a:ext uri="{FF2B5EF4-FFF2-40B4-BE49-F238E27FC236}">
+                <a16:creationId xmlns:a16="http://schemas.microsoft.com/office/drawing/2014/main" id="{53C5D828-9666-E312-B574-9FE965A7D6BE}"/>
+              </a:ext>
+            </a:extLst>
+          </p:cNvPr>
+          <p:cNvSpPr>
+            <a:spLocks noGrp="1"/>
+          </p:cNvSpPr>
+          <p:nvPr>
+            <p:ph type="title"/>
+          </p:nvPr>
+        </p:nvSpPr>
+        <p:spPr>
+          <a:xfrm>
+            <a:off x="900545" y="1967266"/>
+            <a:ext cx="2743200" cy="2547257"/>
+          </a:xfrm>
+          <a:noFill/>
+        </p:spPr>
+        <p:txBody>
+          <a:bodyPr vert="horz" lIns="91440" tIns="45720" rIns="91440" bIns="45720" rtlCol="0" anchor="ctr">
+            <a:normAutofit/>
+          </a:bodyPr>
+          <a:lstStyle/>
+          <a:p>
+            <a:pPr algn="ctr"/>
+            <a:r>
+              <a:rPr lang="en-US" sz="3600" kern="1200" dirty="0">
+                <a:solidFill>
+                  <a:srgbClr val="FFFFFF"/>
+                </a:solidFill>
+                <a:latin typeface="+mj-lt"/>
+                <a:ea typeface="+mj-ea"/>
+                <a:cs typeface="+mj-cs"/>
+              </a:rPr>
+              <a:t>Kubernetes – </a:t>
+            </a:r>
+            <a:r>
+              <a:rPr lang="en-US" sz="3600" dirty="0">
+                <a:solidFill>
+                  <a:srgbClr val="FFFFFF"/>
+                </a:solidFill>
+              </a:rPr>
+              <a:t>Demo</a:t>
+            </a:r>
+            <a:endParaRPr lang="en-US" sz="3600" kern="1200" dirty="0">
+              <a:solidFill>
+                <a:srgbClr val="FFFFFF"/>
+              </a:solidFill>
+              <a:latin typeface="+mj-lt"/>
+              <a:ea typeface="+mj-ea"/>
+              <a:cs typeface="+mj-cs"/>
+            </a:endParaRPr>
+          </a:p>
+        </p:txBody>
+      </p:sp>
+      <p:sp>
+        <p:nvSpPr>
+          <p:cNvPr id="3" name="Footer Placeholder 2">
+            <a:extLst>
+              <a:ext uri="{FF2B5EF4-FFF2-40B4-BE49-F238E27FC236}">
+                <a16:creationId xmlns:a16="http://schemas.microsoft.com/office/drawing/2014/main" id="{5AA19FA0-A765-8169-03F1-928E3EF7B595}"/>
+              </a:ext>
+            </a:extLst>
+          </p:cNvPr>
+          <p:cNvSpPr>
+            <a:spLocks noGrp="1"/>
+          </p:cNvSpPr>
+          <p:nvPr>
+            <p:ph type="ftr" sz="quarter" idx="11"/>
+          </p:nvPr>
+        </p:nvSpPr>
+        <p:spPr/>
+        <p:txBody>
+          <a:bodyPr/>
+          <a:lstStyle/>
+          <a:p>
+            <a:r>
+              <a:rPr lang="pt-BR"/>
+              <a:t>Step 8. Kubernetes - ver. 1</a:t>
+            </a:r>
+            <a:endParaRPr lang="ru-UA"/>
+          </a:p>
+        </p:txBody>
+      </p:sp>
+      <p:pic>
+        <p:nvPicPr>
+          <p:cNvPr id="6" name="Picture 5">
+            <a:extLst>
+              <a:ext uri="{FF2B5EF4-FFF2-40B4-BE49-F238E27FC236}">
+                <a16:creationId xmlns:a16="http://schemas.microsoft.com/office/drawing/2014/main" id="{A3571683-0A9A-4135-6285-8210F80901C7}"/>
+              </a:ext>
+            </a:extLst>
+          </p:cNvPr>
+          <p:cNvPicPr>
+            <a:picLocks noChangeAspect="1"/>
+          </p:cNvPicPr>
+          <p:nvPr/>
+        </p:nvPicPr>
+        <p:blipFill>
+          <a:blip r:embed="rId2"/>
+          <a:stretch>
+            <a:fillRect/>
+          </a:stretch>
+        </p:blipFill>
+        <p:spPr>
+          <a:xfrm>
+            <a:off x="6125894" y="1967266"/>
+            <a:ext cx="3699164" cy="2774373"/>
+          </a:xfrm>
+          <a:prstGeom prst="rect">
+            <a:avLst/>
+          </a:prstGeom>
+        </p:spPr>
+      </p:pic>
+    </p:spTree>
+    <p:extLst>
+      <p:ext uri="{BB962C8B-B14F-4D97-AF65-F5344CB8AC3E}">
+        <p14:creationId xmlns:p14="http://schemas.microsoft.com/office/powerpoint/2010/main" val="3987160844"/>
       </p:ext>
     </p:extLst>
   </p:cSld>

</xml_diff>